<commit_message>
fixed CfgManager aggregation arrows direction
</commit_message>
<xml_diff>
--- a/presentation/Configurable Configuration Manager.pptx
+++ b/presentation/Configurable Configuration Manager.pptx
@@ -139,7 +139,7 @@
 <file path=ppt/revisionInfo.xml><?xml version="1.0" encoding="utf-8"?>
 <p1510:revInfo xmlns:a="http://schemas.openxmlformats.org/drawingml/2006/main" xmlns:r="http://schemas.openxmlformats.org/officeDocument/2006/relationships" xmlns:p1510="http://schemas.microsoft.com/office/powerpoint/2015/10/main">
   <p1510:revLst>
-    <p1510:client id="{9EBC39BA-0836-4ABE-A36F-F10AD24B4704}" v="4191" dt="2018-09-07T07:40:43.764"/>
+    <p1510:client id="{4453F9B8-B8FC-6348-9FBF-B056A5C2BAB8}" v="78" dt="2018-09-12T17:13:05.133"/>
   </p1510:revLst>
 </p1510:revInfo>
 </file>
@@ -1194,6 +1194,193 @@
             <pc:docMk/>
             <pc:sldMk cId="1164631372" sldId="279"/>
             <ac:picMk id="6" creationId="{197868D8-DE92-4528-A878-CE9D739D47D2}"/>
+          </ac:picMkLst>
+        </pc:picChg>
+      </pc:sldChg>
+    </pc:docChg>
+  </pc:docChgLst>
+  <pc:docChgLst>
+    <pc:chgData name="Francois Normandin" userId="1f8f815188830f7c" providerId="LiveId" clId="{4453F9B8-B8FC-6348-9FBF-B056A5C2BAB8}"/>
+    <pc:docChg chg="undo custSel modSld">
+      <pc:chgData name="Francois Normandin" userId="1f8f815188830f7c" providerId="LiveId" clId="{4453F9B8-B8FC-6348-9FBF-B056A5C2BAB8}" dt="2018-09-12T17:13:05.133" v="75" actId="15"/>
+      <pc:docMkLst>
+        <pc:docMk/>
+      </pc:docMkLst>
+      <pc:sldChg chg="addSp modSp">
+        <pc:chgData name="Francois Normandin" userId="1f8f815188830f7c" providerId="LiveId" clId="{4453F9B8-B8FC-6348-9FBF-B056A5C2BAB8}" dt="2018-09-12T13:53:00.060" v="6" actId="1076"/>
+        <pc:sldMkLst>
+          <pc:docMk/>
+          <pc:sldMk cId="2305558086" sldId="263"/>
+        </pc:sldMkLst>
+        <pc:spChg chg="mod">
+          <ac:chgData name="Francois Normandin" userId="1f8f815188830f7c" providerId="LiveId" clId="{4453F9B8-B8FC-6348-9FBF-B056A5C2BAB8}" dt="2018-09-12T13:53:00.060" v="6" actId="1076"/>
+          <ac:spMkLst>
+            <pc:docMk/>
+            <pc:sldMk cId="2305558086" sldId="263"/>
+            <ac:spMk id="3" creationId="{CF0BA2ED-E552-214F-9B9A-4AE265F2D943}"/>
+          </ac:spMkLst>
+        </pc:spChg>
+        <pc:picChg chg="mod">
+          <ac:chgData name="Francois Normandin" userId="1f8f815188830f7c" providerId="LiveId" clId="{4453F9B8-B8FC-6348-9FBF-B056A5C2BAB8}" dt="2018-09-12T13:52:50.355" v="2" actId="1076"/>
+          <ac:picMkLst>
+            <pc:docMk/>
+            <pc:sldMk cId="2305558086" sldId="263"/>
+            <ac:picMk id="4" creationId="{56695F50-D074-664B-B0A9-6B366BEA9089}"/>
+          </ac:picMkLst>
+        </pc:picChg>
+        <pc:picChg chg="add mod">
+          <ac:chgData name="Francois Normandin" userId="1f8f815188830f7c" providerId="LiveId" clId="{4453F9B8-B8FC-6348-9FBF-B056A5C2BAB8}" dt="2018-09-12T13:52:56.302" v="5" actId="1076"/>
+          <ac:picMkLst>
+            <pc:docMk/>
+            <pc:sldMk cId="2305558086" sldId="263"/>
+            <ac:picMk id="5" creationId="{D1871C12-DEF9-6B4E-AE3F-BEBFBECDB08B}"/>
+          </ac:picMkLst>
+        </pc:picChg>
+      </pc:sldChg>
+      <pc:sldChg chg="addSp delSp modSp">
+        <pc:chgData name="Francois Normandin" userId="1f8f815188830f7c" providerId="LiveId" clId="{4453F9B8-B8FC-6348-9FBF-B056A5C2BAB8}" dt="2018-09-12T17:12:15.937" v="41" actId="14100"/>
+        <pc:sldMkLst>
+          <pc:docMk/>
+          <pc:sldMk cId="2990569226" sldId="264"/>
+        </pc:sldMkLst>
+        <pc:picChg chg="add mod">
+          <ac:chgData name="Francois Normandin" userId="1f8f815188830f7c" providerId="LiveId" clId="{4453F9B8-B8FC-6348-9FBF-B056A5C2BAB8}" dt="2018-09-12T17:12:15.937" v="41" actId="14100"/>
+          <ac:picMkLst>
+            <pc:docMk/>
+            <pc:sldMk cId="2990569226" sldId="264"/>
+            <ac:picMk id="5" creationId="{478C7A83-6EEE-0049-8558-F14F11CBE574}"/>
+          </ac:picMkLst>
+        </pc:picChg>
+        <pc:picChg chg="del">
+          <ac:chgData name="Francois Normandin" userId="1f8f815188830f7c" providerId="LiveId" clId="{4453F9B8-B8FC-6348-9FBF-B056A5C2BAB8}" dt="2018-09-12T17:12:11.217" v="38" actId="478"/>
+          <ac:picMkLst>
+            <pc:docMk/>
+            <pc:sldMk cId="2990569226" sldId="264"/>
+            <ac:picMk id="6" creationId="{9DC32AFD-2A20-44F8-A60D-15F31AC57A5F}"/>
+          </ac:picMkLst>
+        </pc:picChg>
+      </pc:sldChg>
+      <pc:sldChg chg="addSp delSp modSp">
+        <pc:chgData name="Francois Normandin" userId="1f8f815188830f7c" providerId="LiveId" clId="{4453F9B8-B8FC-6348-9FBF-B056A5C2BAB8}" dt="2018-09-12T17:12:39.824" v="46" actId="1076"/>
+        <pc:sldMkLst>
+          <pc:docMk/>
+          <pc:sldMk cId="2794880154" sldId="268"/>
+        </pc:sldMkLst>
+        <pc:picChg chg="del">
+          <ac:chgData name="Francois Normandin" userId="1f8f815188830f7c" providerId="LiveId" clId="{4453F9B8-B8FC-6348-9FBF-B056A5C2BAB8}" dt="2018-09-12T17:12:35.058" v="42" actId="478"/>
+          <ac:picMkLst>
+            <pc:docMk/>
+            <pc:sldMk cId="2794880154" sldId="268"/>
+            <ac:picMk id="4" creationId="{DEA4249B-029D-43BE-85C5-6F241BB6792C}"/>
+          </ac:picMkLst>
+        </pc:picChg>
+        <pc:picChg chg="add mod">
+          <ac:chgData name="Francois Normandin" userId="1f8f815188830f7c" providerId="LiveId" clId="{4453F9B8-B8FC-6348-9FBF-B056A5C2BAB8}" dt="2018-09-12T17:12:39.824" v="46" actId="1076"/>
+          <ac:picMkLst>
+            <pc:docMk/>
+            <pc:sldMk cId="2794880154" sldId="268"/>
+            <ac:picMk id="5" creationId="{790F1BED-A64E-E840-B25D-7B32A86C0E0F}"/>
+          </ac:picMkLst>
+        </pc:picChg>
+      </pc:sldChg>
+      <pc:sldChg chg="modSp">
+        <pc:chgData name="Francois Normandin" userId="1f8f815188830f7c" providerId="LiveId" clId="{4453F9B8-B8FC-6348-9FBF-B056A5C2BAB8}" dt="2018-09-12T17:13:05.133" v="75" actId="15"/>
+        <pc:sldMkLst>
+          <pc:docMk/>
+          <pc:sldMk cId="2080379434" sldId="269"/>
+        </pc:sldMkLst>
+        <pc:spChg chg="mod">
+          <ac:chgData name="Francois Normandin" userId="1f8f815188830f7c" providerId="LiveId" clId="{4453F9B8-B8FC-6348-9FBF-B056A5C2BAB8}" dt="2018-09-12T17:13:05.133" v="75" actId="15"/>
+          <ac:spMkLst>
+            <pc:docMk/>
+            <pc:sldMk cId="2080379434" sldId="269"/>
+            <ac:spMk id="3" creationId="{D924EDD9-B04D-8642-B914-DA9DAB92FD5E}"/>
+          </ac:spMkLst>
+        </pc:spChg>
+      </pc:sldChg>
+      <pc:sldChg chg="addSp delSp modSp delAnim">
+        <pc:chgData name="Francois Normandin" userId="1f8f815188830f7c" providerId="LiveId" clId="{4453F9B8-B8FC-6348-9FBF-B056A5C2BAB8}" dt="2018-09-12T17:11:41.310" v="37" actId="14100"/>
+        <pc:sldMkLst>
+          <pc:docMk/>
+          <pc:sldMk cId="1688923017" sldId="272"/>
+        </pc:sldMkLst>
+        <pc:picChg chg="add mod">
+          <ac:chgData name="Francois Normandin" userId="1f8f815188830f7c" providerId="LiveId" clId="{4453F9B8-B8FC-6348-9FBF-B056A5C2BAB8}" dt="2018-09-12T17:11:41.310" v="37" actId="14100"/>
+          <ac:picMkLst>
+            <pc:docMk/>
+            <pc:sldMk cId="1688923017" sldId="272"/>
+            <ac:picMk id="3" creationId="{909E8CBA-1426-8F42-A96E-16A7F7D2EF38}"/>
+          </ac:picMkLst>
+        </pc:picChg>
+        <pc:picChg chg="add mod">
+          <ac:chgData name="Francois Normandin" userId="1f8f815188830f7c" providerId="LiveId" clId="{4453F9B8-B8FC-6348-9FBF-B056A5C2BAB8}" dt="2018-09-12T17:11:35.729" v="34" actId="1076"/>
+          <ac:picMkLst>
+            <pc:docMk/>
+            <pc:sldMk cId="1688923017" sldId="272"/>
+            <ac:picMk id="5" creationId="{C7208F84-5271-B341-A46D-B229C14D75FA}"/>
+          </ac:picMkLst>
+        </pc:picChg>
+        <pc:picChg chg="add mod">
+          <ac:chgData name="Francois Normandin" userId="1f8f815188830f7c" providerId="LiveId" clId="{4453F9B8-B8FC-6348-9FBF-B056A5C2BAB8}" dt="2018-09-12T17:11:07.853" v="27" actId="1076"/>
+          <ac:picMkLst>
+            <pc:docMk/>
+            <pc:sldMk cId="1688923017" sldId="272"/>
+            <ac:picMk id="7" creationId="{DF7C14D7-698C-2B4A-A5BF-EC6F1D60DA6D}"/>
+          </ac:picMkLst>
+        </pc:picChg>
+        <pc:picChg chg="add mod">
+          <ac:chgData name="Francois Normandin" userId="1f8f815188830f7c" providerId="LiveId" clId="{4453F9B8-B8FC-6348-9FBF-B056A5C2BAB8}" dt="2018-09-12T17:11:32.033" v="32" actId="1076"/>
+          <ac:picMkLst>
+            <pc:docMk/>
+            <pc:sldMk cId="1688923017" sldId="272"/>
+            <ac:picMk id="8" creationId="{84D1D9D8-379A-5C4A-8E3D-BDC51C2ED970}"/>
+          </ac:picMkLst>
+        </pc:picChg>
+        <pc:picChg chg="del">
+          <ac:chgData name="Francois Normandin" userId="1f8f815188830f7c" providerId="LiveId" clId="{4453F9B8-B8FC-6348-9FBF-B056A5C2BAB8}" dt="2018-09-12T17:11:03.328" v="23" actId="478"/>
+          <ac:picMkLst>
+            <pc:docMk/>
+            <pc:sldMk cId="1688923017" sldId="272"/>
+            <ac:picMk id="9" creationId="{38112193-1E44-434F-B820-2AB42A5006C7}"/>
+          </ac:picMkLst>
+        </pc:picChg>
+        <pc:picChg chg="del">
+          <ac:chgData name="Francois Normandin" userId="1f8f815188830f7c" providerId="LiveId" clId="{4453F9B8-B8FC-6348-9FBF-B056A5C2BAB8}" dt="2018-09-12T17:09:37.526" v="18" actId="478"/>
+          <ac:picMkLst>
+            <pc:docMk/>
+            <pc:sldMk cId="1688923017" sldId="272"/>
+            <ac:picMk id="10" creationId="{9798EF22-C64A-441F-AA69-75C765AF1B6E}"/>
+          </ac:picMkLst>
+        </pc:picChg>
+        <pc:picChg chg="del">
+          <ac:chgData name="Francois Normandin" userId="1f8f815188830f7c" providerId="LiveId" clId="{4453F9B8-B8FC-6348-9FBF-B056A5C2BAB8}" dt="2018-09-12T17:10:43.291" v="20" actId="478"/>
+          <ac:picMkLst>
+            <pc:docMk/>
+            <pc:sldMk cId="1688923017" sldId="272"/>
+            <ac:picMk id="11" creationId="{EC5FE919-C345-41E0-86DF-03FA35A3DBD0}"/>
+          </ac:picMkLst>
+        </pc:picChg>
+        <pc:picChg chg="del">
+          <ac:chgData name="Francois Normandin" userId="1f8f815188830f7c" providerId="LiveId" clId="{4453F9B8-B8FC-6348-9FBF-B056A5C2BAB8}" dt="2018-09-12T17:11:25.550" v="28" actId="478"/>
+          <ac:picMkLst>
+            <pc:docMk/>
+            <pc:sldMk cId="1688923017" sldId="272"/>
+            <ac:picMk id="12" creationId="{565CD5D6-889C-42DA-82F8-CEC042A3415B}"/>
+          </ac:picMkLst>
+        </pc:picChg>
+      </pc:sldChg>
+      <pc:sldChg chg="addSp modSp">
+        <pc:chgData name="Francois Normandin" userId="1f8f815188830f7c" providerId="LiveId" clId="{4453F9B8-B8FC-6348-9FBF-B056A5C2BAB8}" dt="2018-09-12T16:57:42.674" v="15" actId="1076"/>
+        <pc:sldMkLst>
+          <pc:docMk/>
+          <pc:sldMk cId="3965550958" sldId="273"/>
+        </pc:sldMkLst>
+        <pc:picChg chg="add mod">
+          <ac:chgData name="Francois Normandin" userId="1f8f815188830f7c" providerId="LiveId" clId="{4453F9B8-B8FC-6348-9FBF-B056A5C2BAB8}" dt="2018-09-12T16:57:42.674" v="15" actId="1076"/>
+          <ac:picMkLst>
+            <pc:docMk/>
+            <pc:sldMk cId="3965550958" sldId="273"/>
+            <ac:picMk id="5" creationId="{2087FBE1-A7F3-864C-8BFB-EAD88E4EA4D1}"/>
           </ac:picMkLst>
         </pc:picChg>
       </pc:sldChg>
@@ -4159,10 +4346,10 @@
     <dgm:cxn modelId="{8EEAF92F-DFE8-454D-9C49-49C811E91775}" type="presOf" srcId="{B19466A7-2DA3-4E06-8092-A473878700D6}" destId="{86723D5E-0481-4AEA-9EEB-87CA3DBAA5D0}" srcOrd="0" destOrd="0" presId="urn:microsoft.com/office/officeart/2018/5/layout/CenteredIconLabelDescriptionList"/>
     <dgm:cxn modelId="{47C19D39-52D2-44AA-BA76-C796EAE0D293}" srcId="{B19466A7-2DA3-4E06-8092-A473878700D6}" destId="{B1D61C09-14B2-4ED0-B89B-52E7139531B4}" srcOrd="0" destOrd="0" parTransId="{389FD7F3-9FD0-4B62-9D93-A38295EF2437}" sibTransId="{0860D734-79BC-4D38-98B2-93100E2F43E8}"/>
     <dgm:cxn modelId="{B3717943-50AF-495D-A87D-7212A416A74F}" type="presOf" srcId="{DF00FBD6-4EC9-495D-99BF-99888FAA5629}" destId="{C79C6F09-B698-47CE-8045-D464C5647E31}" srcOrd="0" destOrd="0" presId="urn:microsoft.com/office/officeart/2018/5/layout/CenteredIconLabelDescriptionList"/>
+    <dgm:cxn modelId="{9EDD075A-3DFD-4B02-9A46-CB6281C5523C}" type="presOf" srcId="{A8884B24-AE24-4533-8EF1-3E7EC7F660D2}" destId="{BC6D2DFE-3954-470B-A66D-4A80EFE17F7A}" srcOrd="0" destOrd="0" presId="urn:microsoft.com/office/officeart/2018/5/layout/CenteredIconLabelDescriptionList"/>
     <dgm:cxn modelId="{C9653967-4A22-4366-AD30-44EE5211D26A}" srcId="{8431B437-CFB5-4480-8A3B-17AB4EEA8BE7}" destId="{CA2F24D1-E5EF-4405-9E52-AFAC55D49FF4}" srcOrd="3" destOrd="0" parTransId="{7A0621C9-7CE2-49A4-A292-896C92CC0807}" sibTransId="{653802E5-36E4-4363-989A-51EC7C5CE3D5}"/>
     <dgm:cxn modelId="{57715E6A-BCE1-4AD0-8929-1DAFF2A548C2}" type="presOf" srcId="{BB8BD59B-6569-4660-BFA3-4289BC04D6D6}" destId="{B36C9619-3CA4-4483-BA20-F8CDD01F281C}" srcOrd="0" destOrd="1" presId="urn:microsoft.com/office/officeart/2018/5/layout/CenteredIconLabelDescriptionList"/>
     <dgm:cxn modelId="{5BE9F76D-EA3C-4629-93B6-529BFFC59CD5}" type="presOf" srcId="{CBEF7021-614B-4C57-A530-1B8E053A8853}" destId="{F2EB9878-F453-4C39-AA6D-43BF3947B51D}" srcOrd="0" destOrd="0" presId="urn:microsoft.com/office/officeart/2018/5/layout/CenteredIconLabelDescriptionList"/>
-    <dgm:cxn modelId="{9EDD075A-3DFD-4B02-9A46-CB6281C5523C}" type="presOf" srcId="{A8884B24-AE24-4533-8EF1-3E7EC7F660D2}" destId="{BC6D2DFE-3954-470B-A66D-4A80EFE17F7A}" srcOrd="0" destOrd="0" presId="urn:microsoft.com/office/officeart/2018/5/layout/CenteredIconLabelDescriptionList"/>
     <dgm:cxn modelId="{F10C727B-FFD4-4A32-8992-61CBEDA42D93}" srcId="{CA2F24D1-E5EF-4405-9E52-AFAC55D49FF4}" destId="{BB8BD59B-6569-4660-BFA3-4289BC04D6D6}" srcOrd="1" destOrd="0" parTransId="{770E909D-43F0-4EDF-BE51-BAD8FD0E36DB}" sibTransId="{9A0D2664-2352-4C96-9E65-77AFE50ED551}"/>
     <dgm:cxn modelId="{BC7BC381-D027-4ED1-ACFE-638DC715A5B9}" type="presOf" srcId="{B1D61C09-14B2-4ED0-B89B-52E7139531B4}" destId="{EAC0DB18-BF5A-4875-A9AA-7046F7CD85F3}" srcOrd="0" destOrd="0" presId="urn:microsoft.com/office/officeart/2018/5/layout/CenteredIconLabelDescriptionList"/>
     <dgm:cxn modelId="{351B9586-8CE0-4686-8455-4436FE71F242}" srcId="{CA2F24D1-E5EF-4405-9E52-AFAC55D49FF4}" destId="{CA7C7A75-DFEE-4C12-A00B-C62F390B4383}" srcOrd="2" destOrd="0" parTransId="{AA0B7FA6-7D6F-407F-AC5C-8B1F25B0C0A6}" sibTransId="{082AEA27-7787-4B20-A380-913902F23B90}"/>
@@ -4636,11 +4823,11 @@
     <dgm:cxn modelId="{BAF97C30-7095-4AE5-87EC-70113B6F83D4}" srcId="{5D51EC1F-F7E9-4C4B-AADD-58491851833B}" destId="{F72720E5-9C83-405D-B2FE-E9063F67967C}" srcOrd="2" destOrd="0" parTransId="{F5B520F6-10AB-4B72-8E24-920DEAF9165A}" sibTransId="{5801B066-4F90-4DEA-AD9C-FBAEF46C27D1}"/>
     <dgm:cxn modelId="{38B5EC35-0FD2-4EC0-ABDF-0FDE93911257}" type="presOf" srcId="{13D1D173-50C6-4B42-BE93-4EC6DF5B645C}" destId="{8C63D858-805B-46B0-BD40-7A2B98EC165A}" srcOrd="0" destOrd="0" presId="urn:microsoft.com/office/officeart/2005/8/layout/default"/>
     <dgm:cxn modelId="{42037139-0DAD-4C70-B23D-03CEA84BBA67}" type="presOf" srcId="{A7E18799-BB93-4F6E-B08E-CC76208A7D52}" destId="{B34D98D5-8361-489F-9C92-659AB9C06A9C}" srcOrd="0" destOrd="0" presId="urn:microsoft.com/office/officeart/2005/8/layout/default"/>
+    <dgm:cxn modelId="{5519CD42-0996-4EC5-A2F6-9EE852865F2D}" srcId="{5D51EC1F-F7E9-4C4B-AADD-58491851833B}" destId="{13D1D173-50C6-4B42-BE93-4EC6DF5B645C}" srcOrd="3" destOrd="0" parTransId="{CB93EB85-F670-4568-A016-D38B77A5C9C7}" sibTransId="{47036A77-286D-4419-86A3-4F4B322C0DD4}"/>
+    <dgm:cxn modelId="{1E926452-8C7E-4F15-B7C9-EE8602102742}" type="presOf" srcId="{8196EE8E-ACA5-4828-BD72-35EFC0351128}" destId="{F05011EF-8315-402E-AB20-A7437026EB32}" srcOrd="0" destOrd="0" presId="urn:microsoft.com/office/officeart/2005/8/layout/default"/>
     <dgm:cxn modelId="{68B8565F-A430-4F9E-BCDE-72EFF46D718B}" type="presOf" srcId="{0A066FA2-FD05-451F-8295-9A9400972B45}" destId="{6C4A1603-A72F-4D2E-AA53-38FD29ADBD10}" srcOrd="0" destOrd="0" presId="urn:microsoft.com/office/officeart/2005/8/layout/default"/>
     <dgm:cxn modelId="{E4AA9560-F606-4052-A7B9-60555941EBE5}" type="presOf" srcId="{FA139774-F7DE-4551-9CFE-68D99B1F2BD3}" destId="{007468CF-E4D0-4BF5-AC29-E8E0F963D22B}" srcOrd="0" destOrd="0" presId="urn:microsoft.com/office/officeart/2005/8/layout/default"/>
     <dgm:cxn modelId="{48CCBD62-74D8-4420-87D1-4870AD5157B0}" srcId="{5D51EC1F-F7E9-4C4B-AADD-58491851833B}" destId="{FA139774-F7DE-4551-9CFE-68D99B1F2BD3}" srcOrd="0" destOrd="0" parTransId="{43AAC6CD-E058-4D3D-B511-67FC72337892}" sibTransId="{430553BB-63CB-4DF2-B67E-9E9FFF1FAA38}"/>
-    <dgm:cxn modelId="{5519CD42-0996-4EC5-A2F6-9EE852865F2D}" srcId="{5D51EC1F-F7E9-4C4B-AADD-58491851833B}" destId="{13D1D173-50C6-4B42-BE93-4EC6DF5B645C}" srcOrd="3" destOrd="0" parTransId="{CB93EB85-F670-4568-A016-D38B77A5C9C7}" sibTransId="{47036A77-286D-4419-86A3-4F4B322C0DD4}"/>
-    <dgm:cxn modelId="{1E926452-8C7E-4F15-B7C9-EE8602102742}" type="presOf" srcId="{8196EE8E-ACA5-4828-BD72-35EFC0351128}" destId="{F05011EF-8315-402E-AB20-A7437026EB32}" srcOrd="0" destOrd="0" presId="urn:microsoft.com/office/officeart/2005/8/layout/default"/>
     <dgm:cxn modelId="{C285D295-1EC2-43C8-8C68-2C490293099D}" srcId="{5D51EC1F-F7E9-4C4B-AADD-58491851833B}" destId="{9EBF7396-CFC2-4C53-A750-04E7AFE482D4}" srcOrd="5" destOrd="0" parTransId="{05C77D41-E766-4E02-B95B-23D664D0838E}" sibTransId="{803A50D6-8EA2-4564-B7F2-CA12CEFE4692}"/>
     <dgm:cxn modelId="{440B3CA0-361E-4FE2-87D9-D695E336E510}" srcId="{5D51EC1F-F7E9-4C4B-AADD-58491851833B}" destId="{A7E18799-BB93-4F6E-B08E-CC76208A7D52}" srcOrd="4" destOrd="0" parTransId="{9CD9F09F-8049-4068-A338-168D898D0BF4}" sibTransId="{0C88A2A9-3B7A-4192-9BBD-6385579A1714}"/>
     <dgm:cxn modelId="{E60A6AA3-E790-46F0-87E2-66C2A0947D73}" type="presOf" srcId="{9EBF7396-CFC2-4C53-A750-04E7AFE482D4}" destId="{FBADBF23-A995-4C63-ACB5-9D625B3D9F33}" srcOrd="0" destOrd="0" presId="urn:microsoft.com/office/officeart/2005/8/layout/default"/>
@@ -8876,7 +9063,7 @@
           <a:p>
             <a:fld id="{42D41B48-4CD0-7548-A7DB-97BCE68B7616}" type="datetimeFigureOut">
               <a:rPr lang="en-US" smtClean="0"/>
-              <a:t>9/7/2018</a:t>
+              <a:t>9/12/18</a:t>
             </a:fld>
             <a:endParaRPr lang="en-US"/>
           </a:p>
@@ -12839,7 +13026,7 @@
             <a:fld id="{B61BEF0D-F0BB-DE4B-95CE-6DB70DBA9567}" type="datetimeFigureOut">
               <a:rPr lang="en-US" dirty="0"/>
               <a:pPr/>
-              <a:t>9/7/2018</a:t>
+              <a:t>9/12/18</a:t>
             </a:fld>
             <a:endParaRPr lang="en-US" dirty="0"/>
           </a:p>
@@ -13087,7 +13274,7 @@
             <a:fld id="{B61BEF0D-F0BB-DE4B-95CE-6DB70DBA9567}" type="datetimeFigureOut">
               <a:rPr lang="en-US" dirty="0"/>
               <a:pPr/>
-              <a:t>9/7/2018</a:t>
+              <a:t>9/12/18</a:t>
             </a:fld>
             <a:endParaRPr lang="en-US" dirty="0"/>
           </a:p>
@@ -13398,7 +13585,7 @@
             <a:fld id="{B61BEF0D-F0BB-DE4B-95CE-6DB70DBA9567}" type="datetimeFigureOut">
               <a:rPr lang="en-US" dirty="0"/>
               <a:pPr/>
-              <a:t>9/7/2018</a:t>
+              <a:t>9/12/18</a:t>
             </a:fld>
             <a:endParaRPr lang="en-US" dirty="0"/>
           </a:p>
@@ -13736,7 +13923,7 @@
             <a:fld id="{B61BEF0D-F0BB-DE4B-95CE-6DB70DBA9567}" type="datetimeFigureOut">
               <a:rPr lang="en-US" dirty="0"/>
               <a:pPr/>
-              <a:t>9/7/2018</a:t>
+              <a:t>9/12/18</a:t>
             </a:fld>
             <a:endParaRPr lang="en-US" dirty="0"/>
           </a:p>
@@ -14047,7 +14234,7 @@
             <a:fld id="{B61BEF0D-F0BB-DE4B-95CE-6DB70DBA9567}" type="datetimeFigureOut">
               <a:rPr lang="en-US" dirty="0"/>
               <a:pPr/>
-              <a:t>9/7/2018</a:t>
+              <a:t>9/12/18</a:t>
             </a:fld>
             <a:endParaRPr lang="en-US" dirty="0"/>
           </a:p>
@@ -14437,7 +14624,7 @@
             <a:fld id="{B61BEF0D-F0BB-DE4B-95CE-6DB70DBA9567}" type="datetimeFigureOut">
               <a:rPr lang="en-US" dirty="0"/>
               <a:pPr/>
-              <a:t>9/7/2018</a:t>
+              <a:t>9/12/18</a:t>
             </a:fld>
             <a:endParaRPr lang="en-US" dirty="0"/>
           </a:p>
@@ -14603,7 +14790,7 @@
           <a:p>
             <a:fld id="{55C6B4A9-1611-4792-9094-5F34BCA07E0B}" type="datetimeFigureOut">
               <a:rPr lang="en-US" dirty="0"/>
-              <a:t>9/7/2018</a:t>
+              <a:t>9/12/18</a:t>
             </a:fld>
             <a:endParaRPr lang="en-US" dirty="0"/>
           </a:p>
@@ -14779,7 +14966,7 @@
             <a:fld id="{B61BEF0D-F0BB-DE4B-95CE-6DB70DBA9567}" type="datetimeFigureOut">
               <a:rPr lang="en-US" dirty="0"/>
               <a:pPr/>
-              <a:t>9/7/2018</a:t>
+              <a:t>9/12/18</a:t>
             </a:fld>
             <a:endParaRPr lang="en-US" dirty="0"/>
           </a:p>
@@ -14952,7 +15139,7 @@
             <a:fld id="{B61BEF0D-F0BB-DE4B-95CE-6DB70DBA9567}" type="datetimeFigureOut">
               <a:rPr lang="en-US" dirty="0"/>
               <a:pPr/>
-              <a:t>9/7/2018</a:t>
+              <a:t>9/12/18</a:t>
             </a:fld>
             <a:endParaRPr lang="en-US" dirty="0"/>
           </a:p>
@@ -15196,7 +15383,7 @@
             <a:fld id="{B61BEF0D-F0BB-DE4B-95CE-6DB70DBA9567}" type="datetimeFigureOut">
               <a:rPr lang="en-US" dirty="0"/>
               <a:pPr/>
-              <a:t>9/7/2018</a:t>
+              <a:t>9/12/18</a:t>
             </a:fld>
             <a:endParaRPr lang="en-US" dirty="0"/>
           </a:p>
@@ -15424,7 +15611,7 @@
           <a:p>
             <a:fld id="{EB712588-04B1-427B-82EE-E8DB90309F08}" type="datetimeFigureOut">
               <a:rPr lang="en-US" dirty="0"/>
-              <a:t>9/7/2018</a:t>
+              <a:t>9/12/18</a:t>
             </a:fld>
             <a:endParaRPr lang="en-US" dirty="0"/>
           </a:p>
@@ -15794,7 +15981,7 @@
             <a:fld id="{B61BEF0D-F0BB-DE4B-95CE-6DB70DBA9567}" type="datetimeFigureOut">
               <a:rPr lang="en-US" dirty="0"/>
               <a:pPr/>
-              <a:t>9/7/2018</a:t>
+              <a:t>9/12/18</a:t>
             </a:fld>
             <a:endParaRPr lang="en-US" dirty="0"/>
           </a:p>
@@ -15914,7 +16101,7 @@
             <a:fld id="{B61BEF0D-F0BB-DE4B-95CE-6DB70DBA9567}" type="datetimeFigureOut">
               <a:rPr lang="en-US" dirty="0"/>
               <a:pPr/>
-              <a:t>9/7/2018</a:t>
+              <a:t>9/12/18</a:t>
             </a:fld>
             <a:endParaRPr lang="en-US" dirty="0"/>
           </a:p>
@@ -16006,7 +16193,7 @@
             <a:fld id="{B61BEF0D-F0BB-DE4B-95CE-6DB70DBA9567}" type="datetimeFigureOut">
               <a:rPr lang="en-US" dirty="0"/>
               <a:pPr/>
-              <a:t>9/7/2018</a:t>
+              <a:t>9/12/18</a:t>
             </a:fld>
             <a:endParaRPr lang="en-US" dirty="0"/>
           </a:p>
@@ -16257,7 +16444,7 @@
           <a:p>
             <a:fld id="{42A54C80-263E-416B-A8E0-580EDEADCBDC}" type="datetimeFigureOut">
               <a:rPr lang="en-US" dirty="0"/>
-              <a:t>9/7/2018</a:t>
+              <a:t>9/12/18</a:t>
             </a:fld>
             <a:endParaRPr lang="en-US" dirty="0"/>
           </a:p>
@@ -16516,7 +16703,7 @@
             <a:fld id="{B61BEF0D-F0BB-DE4B-95CE-6DB70DBA9567}" type="datetimeFigureOut">
               <a:rPr lang="en-US" dirty="0"/>
               <a:pPr/>
-              <a:t>9/7/2018</a:t>
+              <a:t>9/12/18</a:t>
             </a:fld>
             <a:endParaRPr lang="en-US" dirty="0"/>
           </a:p>
@@ -17256,7 +17443,7 @@
             <a:fld id="{B61BEF0D-F0BB-DE4B-95CE-6DB70DBA9567}" type="datetimeFigureOut">
               <a:rPr lang="en-US" dirty="0"/>
               <a:pPr/>
-              <a:t>9/7/2018</a:t>
+              <a:t>9/12/18</a:t>
             </a:fld>
             <a:endParaRPr lang="en-US" dirty="0"/>
           </a:p>
@@ -19098,7 +19285,7 @@
         </p:blipFill>
         <p:spPr>
           <a:xfrm>
-            <a:off x="817474" y="2159331"/>
+            <a:off x="677334" y="1498001"/>
             <a:ext cx="5283289" cy="2392432"/>
           </a:xfrm>
           <a:prstGeom prst="rect">
@@ -19124,7 +19311,7 @@
         </p:nvSpPr>
         <p:spPr>
           <a:xfrm>
-            <a:off x="6416040" y="2160589"/>
+            <a:off x="6195907" y="1498001"/>
             <a:ext cx="3418074" cy="3880773"/>
           </a:xfrm>
         </p:spPr>
@@ -19156,6 +19343,36 @@
           </a:p>
         </p:txBody>
       </p:sp>
+      <p:pic>
+        <p:nvPicPr>
+          <p:cNvPr id="5" name="Image 4">
+            <a:extLst>
+              <a:ext uri="{FF2B5EF4-FFF2-40B4-BE49-F238E27FC236}">
+                <a16:creationId xmlns:a16="http://schemas.microsoft.com/office/drawing/2014/main" id="{D1871C12-DEF9-6B4E-AE3F-BEBFBECDB08B}"/>
+              </a:ext>
+            </a:extLst>
+          </p:cNvPr>
+          <p:cNvPicPr>
+            <a:picLocks noChangeAspect="1"/>
+          </p:cNvPicPr>
+          <p:nvPr/>
+        </p:nvPicPr>
+        <p:blipFill>
+          <a:blip r:embed="rId4"/>
+          <a:stretch>
+            <a:fillRect/>
+          </a:stretch>
+        </p:blipFill>
+        <p:spPr>
+          <a:xfrm>
+            <a:off x="1134504" y="4100975"/>
+            <a:ext cx="4368947" cy="2318217"/>
+          </a:xfrm>
+          <a:prstGeom prst="rect">
+            <a:avLst/>
+          </a:prstGeom>
+        </p:spPr>
+      </p:pic>
     </p:spTree>
     <p:extLst>
       <p:ext uri="{BB962C8B-B14F-4D97-AF65-F5344CB8AC3E}">
@@ -20134,10 +20351,10 @@
       </p:pic>
       <p:pic>
         <p:nvPicPr>
-          <p:cNvPr id="9" name="Image 8">
+          <p:cNvPr id="3" name="Image 2">
             <a:extLst>
               <a:ext uri="{FF2B5EF4-FFF2-40B4-BE49-F238E27FC236}">
-                <a16:creationId xmlns:a16="http://schemas.microsoft.com/office/drawing/2014/main" id="{38112193-1E44-434F-B820-2AB42A5006C7}"/>
+                <a16:creationId xmlns:a16="http://schemas.microsoft.com/office/drawing/2014/main" id="{909E8CBA-1426-8F42-A96E-16A7F7D2EF38}"/>
               </a:ext>
             </a:extLst>
           </p:cNvPr>
@@ -20154,8 +20371,8 @@
         </p:blipFill>
         <p:spPr>
           <a:xfrm>
-            <a:off x="5849496" y="1270000"/>
-            <a:ext cx="2733675" cy="2238375"/>
+            <a:off x="736583" y="4047068"/>
+            <a:ext cx="2936008" cy="2202006"/>
           </a:xfrm>
           <a:prstGeom prst="rect">
             <a:avLst/>
@@ -20164,10 +20381,10 @@
       </p:pic>
       <p:pic>
         <p:nvPicPr>
-          <p:cNvPr id="10" name="Image 9">
+          <p:cNvPr id="5" name="Image 4">
             <a:extLst>
               <a:ext uri="{FF2B5EF4-FFF2-40B4-BE49-F238E27FC236}">
-                <a16:creationId xmlns:a16="http://schemas.microsoft.com/office/drawing/2014/main" id="{9798EF22-C64A-441F-AA69-75C765AF1B6E}"/>
+                <a16:creationId xmlns:a16="http://schemas.microsoft.com/office/drawing/2014/main" id="{C7208F84-5271-B341-A46D-B229C14D75FA}"/>
               </a:ext>
             </a:extLst>
           </p:cNvPr>
@@ -20184,8 +20401,8 @@
         </p:blipFill>
         <p:spPr>
           <a:xfrm>
-            <a:off x="515463" y="4005168"/>
-            <a:ext cx="2838341" cy="2119588"/>
+            <a:off x="3777556" y="3873188"/>
+            <a:ext cx="3039952" cy="2375885"/>
           </a:xfrm>
           <a:prstGeom prst="rect">
             <a:avLst/>
@@ -20194,10 +20411,10 @@
       </p:pic>
       <p:pic>
         <p:nvPicPr>
-          <p:cNvPr id="11" name="Image 10">
+          <p:cNvPr id="7" name="Image 6">
             <a:extLst>
               <a:ext uri="{FF2B5EF4-FFF2-40B4-BE49-F238E27FC236}">
-                <a16:creationId xmlns:a16="http://schemas.microsoft.com/office/drawing/2014/main" id="{EC5FE919-C345-41E0-86DF-03FA35A3DBD0}"/>
+                <a16:creationId xmlns:a16="http://schemas.microsoft.com/office/drawing/2014/main" id="{DF7C14D7-698C-2B4A-A5BF-EC6F1D60DA6D}"/>
               </a:ext>
             </a:extLst>
           </p:cNvPr>
@@ -20214,8 +20431,8 @@
         </p:blipFill>
         <p:spPr>
           <a:xfrm>
-            <a:off x="3541822" y="3886381"/>
-            <a:ext cx="3004942" cy="2238375"/>
+            <a:off x="6106583" y="1399687"/>
+            <a:ext cx="2461684" cy="2088187"/>
           </a:xfrm>
           <a:prstGeom prst="rect">
             <a:avLst/>
@@ -20224,10 +20441,10 @@
       </p:pic>
       <p:pic>
         <p:nvPicPr>
-          <p:cNvPr id="12" name="Image 11">
+          <p:cNvPr id="8" name="Image 7">
             <a:extLst>
               <a:ext uri="{FF2B5EF4-FFF2-40B4-BE49-F238E27FC236}">
-                <a16:creationId xmlns:a16="http://schemas.microsoft.com/office/drawing/2014/main" id="{565CD5D6-889C-42DA-82F8-CEC042A3415B}"/>
+                <a16:creationId xmlns:a16="http://schemas.microsoft.com/office/drawing/2014/main" id="{84D1D9D8-379A-5C4A-8E3D-BDC51C2ED970}"/>
               </a:ext>
             </a:extLst>
           </p:cNvPr>
@@ -20244,8 +20461,8 @@
         </p:blipFill>
         <p:spPr>
           <a:xfrm>
-            <a:off x="6734782" y="3657689"/>
-            <a:ext cx="3373882" cy="2695757"/>
+            <a:off x="6817508" y="3786367"/>
+            <a:ext cx="3122359" cy="2462706"/>
           </a:xfrm>
           <a:prstGeom prst="rect">
             <a:avLst/>
@@ -20262,216 +20479,6 @@
   <p:clrMapOvr>
     <a:masterClrMapping/>
   </p:clrMapOvr>
-  <p:timing>
-    <p:tnLst>
-      <p:par>
-        <p:cTn id="1" dur="indefinite" restart="never" nodeType="tmRoot">
-          <p:childTnLst>
-            <p:seq concurrent="1" nextAc="seek">
-              <p:cTn id="2" dur="indefinite" nodeType="mainSeq">
-                <p:childTnLst>
-                  <p:par>
-                    <p:cTn id="3" fill="hold">
-                      <p:stCondLst>
-                        <p:cond delay="indefinite"/>
-                      </p:stCondLst>
-                      <p:childTnLst>
-                        <p:par>
-                          <p:cTn id="4" fill="hold">
-                            <p:stCondLst>
-                              <p:cond delay="0"/>
-                            </p:stCondLst>
-                            <p:childTnLst>
-                              <p:par>
-                                <p:cTn id="5" presetID="1" presetClass="entr" presetSubtype="0" fill="hold" nodeType="clickEffect">
-                                  <p:stCondLst>
-                                    <p:cond delay="0"/>
-                                  </p:stCondLst>
-                                  <p:childTnLst>
-                                    <p:set>
-                                      <p:cBhvr>
-                                        <p:cTn id="6" dur="1" fill="hold">
-                                          <p:stCondLst>
-                                            <p:cond delay="0"/>
-                                          </p:stCondLst>
-                                        </p:cTn>
-                                        <p:tgtEl>
-                                          <p:spTgt spid="9"/>
-                                        </p:tgtEl>
-                                        <p:attrNameLst>
-                                          <p:attrName>style.visibility</p:attrName>
-                                        </p:attrNameLst>
-                                      </p:cBhvr>
-                                      <p:to>
-                                        <p:strVal val="visible"/>
-                                      </p:to>
-                                    </p:set>
-                                  </p:childTnLst>
-                                </p:cTn>
-                              </p:par>
-                            </p:childTnLst>
-                          </p:cTn>
-                        </p:par>
-                      </p:childTnLst>
-                    </p:cTn>
-                  </p:par>
-                  <p:par>
-                    <p:cTn id="7" fill="hold">
-                      <p:stCondLst>
-                        <p:cond delay="indefinite"/>
-                      </p:stCondLst>
-                      <p:childTnLst>
-                        <p:par>
-                          <p:cTn id="8" fill="hold">
-                            <p:stCondLst>
-                              <p:cond delay="0"/>
-                            </p:stCondLst>
-                            <p:childTnLst>
-                              <p:par>
-                                <p:cTn id="9" presetID="1" presetClass="entr" presetSubtype="0" fill="hold" nodeType="clickEffect">
-                                  <p:stCondLst>
-                                    <p:cond delay="0"/>
-                                  </p:stCondLst>
-                                  <p:childTnLst>
-                                    <p:set>
-                                      <p:cBhvr>
-                                        <p:cTn id="10" dur="1" fill="hold">
-                                          <p:stCondLst>
-                                            <p:cond delay="0"/>
-                                          </p:stCondLst>
-                                        </p:cTn>
-                                        <p:tgtEl>
-                                          <p:spTgt spid="10"/>
-                                        </p:tgtEl>
-                                        <p:attrNameLst>
-                                          <p:attrName>style.visibility</p:attrName>
-                                        </p:attrNameLst>
-                                      </p:cBhvr>
-                                      <p:to>
-                                        <p:strVal val="visible"/>
-                                      </p:to>
-                                    </p:set>
-                                  </p:childTnLst>
-                                </p:cTn>
-                              </p:par>
-                            </p:childTnLst>
-                          </p:cTn>
-                        </p:par>
-                      </p:childTnLst>
-                    </p:cTn>
-                  </p:par>
-                  <p:par>
-                    <p:cTn id="11" fill="hold">
-                      <p:stCondLst>
-                        <p:cond delay="indefinite"/>
-                      </p:stCondLst>
-                      <p:childTnLst>
-                        <p:par>
-                          <p:cTn id="12" fill="hold">
-                            <p:stCondLst>
-                              <p:cond delay="0"/>
-                            </p:stCondLst>
-                            <p:childTnLst>
-                              <p:par>
-                                <p:cTn id="13" presetID="1" presetClass="entr" presetSubtype="0" fill="hold" nodeType="clickEffect">
-                                  <p:stCondLst>
-                                    <p:cond delay="0"/>
-                                  </p:stCondLst>
-                                  <p:childTnLst>
-                                    <p:set>
-                                      <p:cBhvr>
-                                        <p:cTn id="14" dur="1" fill="hold">
-                                          <p:stCondLst>
-                                            <p:cond delay="0"/>
-                                          </p:stCondLst>
-                                        </p:cTn>
-                                        <p:tgtEl>
-                                          <p:spTgt spid="11"/>
-                                        </p:tgtEl>
-                                        <p:attrNameLst>
-                                          <p:attrName>style.visibility</p:attrName>
-                                        </p:attrNameLst>
-                                      </p:cBhvr>
-                                      <p:to>
-                                        <p:strVal val="visible"/>
-                                      </p:to>
-                                    </p:set>
-                                  </p:childTnLst>
-                                </p:cTn>
-                              </p:par>
-                            </p:childTnLst>
-                          </p:cTn>
-                        </p:par>
-                      </p:childTnLst>
-                    </p:cTn>
-                  </p:par>
-                  <p:par>
-                    <p:cTn id="15" fill="hold">
-                      <p:stCondLst>
-                        <p:cond delay="indefinite"/>
-                      </p:stCondLst>
-                      <p:childTnLst>
-                        <p:par>
-                          <p:cTn id="16" fill="hold">
-                            <p:stCondLst>
-                              <p:cond delay="0"/>
-                            </p:stCondLst>
-                            <p:childTnLst>
-                              <p:par>
-                                <p:cTn id="17" presetID="1" presetClass="entr" presetSubtype="0" fill="hold" nodeType="clickEffect">
-                                  <p:stCondLst>
-                                    <p:cond delay="0"/>
-                                  </p:stCondLst>
-                                  <p:childTnLst>
-                                    <p:set>
-                                      <p:cBhvr>
-                                        <p:cTn id="18" dur="1" fill="hold">
-                                          <p:stCondLst>
-                                            <p:cond delay="0"/>
-                                          </p:stCondLst>
-                                        </p:cTn>
-                                        <p:tgtEl>
-                                          <p:spTgt spid="12"/>
-                                        </p:tgtEl>
-                                        <p:attrNameLst>
-                                          <p:attrName>style.visibility</p:attrName>
-                                        </p:attrNameLst>
-                                      </p:cBhvr>
-                                      <p:to>
-                                        <p:strVal val="visible"/>
-                                      </p:to>
-                                    </p:set>
-                                  </p:childTnLst>
-                                </p:cTn>
-                              </p:par>
-                            </p:childTnLst>
-                          </p:cTn>
-                        </p:par>
-                      </p:childTnLst>
-                    </p:cTn>
-                  </p:par>
-                </p:childTnLst>
-              </p:cTn>
-              <p:prevCondLst>
-                <p:cond evt="onPrev" delay="0">
-                  <p:tgtEl>
-                    <p:sldTgt/>
-                  </p:tgtEl>
-                </p:cond>
-              </p:prevCondLst>
-              <p:nextCondLst>
-                <p:cond evt="onNext" delay="0">
-                  <p:tgtEl>
-                    <p:sldTgt/>
-                  </p:tgtEl>
-                </p:cond>
-              </p:nextCondLst>
-            </p:seq>
-          </p:childTnLst>
-        </p:cTn>
-      </p:par>
-    </p:tnLst>
-  </p:timing>
 </p:sld>
 </file>
 
@@ -21254,36 +21261,6 @@
           </a:prstGeom>
         </p:spPr>
       </p:pic>
-      <p:pic>
-        <p:nvPicPr>
-          <p:cNvPr id="6" name="Image 5">
-            <a:extLst>
-              <a:ext uri="{FF2B5EF4-FFF2-40B4-BE49-F238E27FC236}">
-                <a16:creationId xmlns:a16="http://schemas.microsoft.com/office/drawing/2014/main" id="{9DC32AFD-2A20-44F8-A60D-15F31AC57A5F}"/>
-              </a:ext>
-            </a:extLst>
-          </p:cNvPr>
-          <p:cNvPicPr>
-            <a:picLocks noChangeAspect="1"/>
-          </p:cNvPicPr>
-          <p:nvPr/>
-        </p:nvPicPr>
-        <p:blipFill>
-          <a:blip r:embed="rId4"/>
-          <a:stretch>
-            <a:fillRect/>
-          </a:stretch>
-        </p:blipFill>
-        <p:spPr>
-          <a:xfrm>
-            <a:off x="290138" y="1663444"/>
-            <a:ext cx="3014058" cy="2245166"/>
-          </a:xfrm>
-          <a:prstGeom prst="rect">
-            <a:avLst/>
-          </a:prstGeom>
-        </p:spPr>
-      </p:pic>
       <p:sp>
         <p:nvSpPr>
           <p:cNvPr id="7" name="Rectangle 6">
@@ -21347,7 +21324,7 @@
           <p:nvPr/>
         </p:nvPicPr>
         <p:blipFill>
-          <a:blip r:embed="rId5"/>
+          <a:blip r:embed="rId4"/>
           <a:stretch>
             <a:fillRect/>
           </a:stretch>
@@ -21385,7 +21362,7 @@
           <p:nvPr/>
         </p:nvPicPr>
         <p:blipFill>
-          <a:blip r:embed="rId6"/>
+          <a:blip r:embed="rId5"/>
           <a:stretch>
             <a:fillRect/>
           </a:stretch>
@@ -21423,7 +21400,7 @@
           <p:nvPr/>
         </p:nvPicPr>
         <p:blipFill>
-          <a:blip r:embed="rId7"/>
+          <a:blip r:embed="rId6"/>
           <a:stretch>
             <a:fillRect/>
           </a:stretch>
@@ -21444,6 +21421,36 @@
               </a:schemeClr>
             </a:glow>
           </a:effectLst>
+        </p:spPr>
+      </p:pic>
+      <p:pic>
+        <p:nvPicPr>
+          <p:cNvPr id="5" name="Image 4">
+            <a:extLst>
+              <a:ext uri="{FF2B5EF4-FFF2-40B4-BE49-F238E27FC236}">
+                <a16:creationId xmlns:a16="http://schemas.microsoft.com/office/drawing/2014/main" id="{478C7A83-6EEE-0049-8558-F14F11CBE574}"/>
+              </a:ext>
+            </a:extLst>
+          </p:cNvPr>
+          <p:cNvPicPr>
+            <a:picLocks noChangeAspect="1"/>
+          </p:cNvPicPr>
+          <p:nvPr/>
+        </p:nvPicPr>
+        <p:blipFill>
+          <a:blip r:embed="rId7"/>
+          <a:stretch>
+            <a:fillRect/>
+          </a:stretch>
+        </p:blipFill>
+        <p:spPr>
+          <a:xfrm>
+            <a:off x="489311" y="1530478"/>
+            <a:ext cx="3017041" cy="2357979"/>
+          </a:xfrm>
+          <a:prstGeom prst="rect">
+            <a:avLst/>
+          </a:prstGeom>
         </p:spPr>
       </p:pic>
     </p:spTree>
@@ -22154,36 +22161,6 @@
           </a:p>
         </p:txBody>
       </p:sp>
-      <p:pic>
-        <p:nvPicPr>
-          <p:cNvPr id="4" name="Image 3">
-            <a:extLst>
-              <a:ext uri="{FF2B5EF4-FFF2-40B4-BE49-F238E27FC236}">
-                <a16:creationId xmlns:a16="http://schemas.microsoft.com/office/drawing/2014/main" id="{DEA4249B-029D-43BE-85C5-6F241BB6792C}"/>
-              </a:ext>
-            </a:extLst>
-          </p:cNvPr>
-          <p:cNvPicPr>
-            <a:picLocks noChangeAspect="1"/>
-          </p:cNvPicPr>
-          <p:nvPr/>
-        </p:nvPicPr>
-        <p:blipFill>
-          <a:blip r:embed="rId3"/>
-          <a:stretch>
-            <a:fillRect/>
-          </a:stretch>
-        </p:blipFill>
-        <p:spPr>
-          <a:xfrm>
-            <a:off x="6096001" y="1367895"/>
-            <a:ext cx="5143500" cy="4109694"/>
-          </a:xfrm>
-          <a:prstGeom prst="rect">
-            <a:avLst/>
-          </a:prstGeom>
-        </p:spPr>
-      </p:pic>
       <p:sp>
         <p:nvSpPr>
           <p:cNvPr id="32" name="Isosceles Triangle 14">
@@ -22249,6 +22226,36 @@
           </a:p>
         </p:txBody>
       </p:sp>
+      <p:pic>
+        <p:nvPicPr>
+          <p:cNvPr id="5" name="Image 4">
+            <a:extLst>
+              <a:ext uri="{FF2B5EF4-FFF2-40B4-BE49-F238E27FC236}">
+                <a16:creationId xmlns:a16="http://schemas.microsoft.com/office/drawing/2014/main" id="{790F1BED-A64E-E840-B25D-7B32A86C0E0F}"/>
+              </a:ext>
+            </a:extLst>
+          </p:cNvPr>
+          <p:cNvPicPr>
+            <a:picLocks noChangeAspect="1"/>
+          </p:cNvPicPr>
+          <p:nvPr/>
+        </p:nvPicPr>
+        <p:blipFill>
+          <a:blip r:embed="rId3"/>
+          <a:stretch>
+            <a:fillRect/>
+          </a:stretch>
+        </p:blipFill>
+        <p:spPr>
+          <a:xfrm>
+            <a:off x="5808457" y="1117374"/>
+            <a:ext cx="5684216" cy="4483325"/>
+          </a:xfrm>
+          <a:prstGeom prst="rect">
+            <a:avLst/>
+          </a:prstGeom>
+        </p:spPr>
+      </p:pic>
     </p:spTree>
     <p:extLst>
       <p:ext uri="{BB962C8B-B14F-4D97-AF65-F5344CB8AC3E}">
@@ -22334,8 +22341,33 @@
           </a:xfrm>
         </p:spPr>
         <p:txBody>
-          <a:bodyPr/>
+          <a:bodyPr>
+            <a:normAutofit fontScale="92500" lnSpcReduction="20000"/>
+          </a:bodyPr>
           <a:lstStyle/>
+          <a:p>
+            <a:r>
+              <a:rPr lang="en-US"/>
+              <a:t>This Presentation</a:t>
+            </a:r>
+          </a:p>
+          <a:p>
+            <a:pPr lvl="1"/>
+            <a:r>
+              <a:rPr lang="en-US"/>
+              <a:t>https</a:t>
+            </a:r>
+            <a:r>
+              <a:rPr lang="en-US" dirty="0"/>
+              <a:t>://github.com/francois-normandin/CfgManager_CLASummit2018</a:t>
+            </a:r>
+          </a:p>
+          <a:p>
+            <a:pPr marL="0" indent="0">
+              <a:buNone/>
+            </a:pPr>
+            <a:endParaRPr lang="en-US" dirty="0"/>
+          </a:p>
           <a:p>
             <a:r>
               <a:rPr lang="en-US" dirty="0"/>
@@ -23444,6 +23476,36 @@
           <a:xfrm>
             <a:off x="677334" y="1864980"/>
             <a:ext cx="8754533" cy="3282950"/>
+          </a:xfrm>
+          <a:prstGeom prst="rect">
+            <a:avLst/>
+          </a:prstGeom>
+        </p:spPr>
+      </p:pic>
+      <p:pic>
+        <p:nvPicPr>
+          <p:cNvPr id="5" name="Image 4">
+            <a:extLst>
+              <a:ext uri="{FF2B5EF4-FFF2-40B4-BE49-F238E27FC236}">
+                <a16:creationId xmlns:a16="http://schemas.microsoft.com/office/drawing/2014/main" id="{2087FBE1-A7F3-864C-8BFB-EAD88E4EA4D1}"/>
+              </a:ext>
+            </a:extLst>
+          </p:cNvPr>
+          <p:cNvPicPr>
+            <a:picLocks noChangeAspect="1"/>
+          </p:cNvPicPr>
+          <p:nvPr/>
+        </p:nvPicPr>
+        <p:blipFill>
+          <a:blip r:embed="rId4"/>
+          <a:stretch>
+            <a:fillRect/>
+          </a:stretch>
+        </p:blipFill>
+        <p:spPr>
+          <a:xfrm>
+            <a:off x="5054600" y="1771847"/>
+            <a:ext cx="4501444" cy="3376083"/>
           </a:xfrm>
           <a:prstGeom prst="rect">
             <a:avLst/>

</xml_diff>